<commit_message>
Network test, AP, STA and AP_STA.
</commit_message>
<xml_diff>
--- a/Proxi ESP32.pptx
+++ b/Proxi ESP32.pptx
@@ -106,6 +106,11 @@
       </a:defRPr>
     </a:lvl9pPr>
   </p:defaultTextStyle>
+  <p:extLst>
+    <p:ext uri="{EFAFB233-063F-42B5-8137-9DF3F51BA10A}">
+      <p15:sldGuideLst xmlns:p15="http://schemas.microsoft.com/office/powerpoint/2012/main"/>
+    </p:ext>
+  </p:extLst>
 </p:presentation>
 </file>
 
@@ -335,7 +340,7 @@
           <a:p>
             <a:fld id="{4246B5AE-8C22-41D9-A161-61EDA0444373}" type="datetimeFigureOut">
               <a:rPr lang="es-EC" smtClean="0"/>
-              <a:t>22/02/2024</a:t>
+              <a:t>28/02/2024</a:t>
             </a:fld>
             <a:endParaRPr lang="es-EC"/>
           </a:p>
@@ -543,7 +548,7 @@
           <a:p>
             <a:fld id="{4246B5AE-8C22-41D9-A161-61EDA0444373}" type="datetimeFigureOut">
               <a:rPr lang="es-EC" smtClean="0"/>
-              <a:t>22/02/2024</a:t>
+              <a:t>28/02/2024</a:t>
             </a:fld>
             <a:endParaRPr lang="es-EC"/>
           </a:p>
@@ -799,7 +804,7 @@
           <a:p>
             <a:fld id="{4246B5AE-8C22-41D9-A161-61EDA0444373}" type="datetimeFigureOut">
               <a:rPr lang="es-EC" smtClean="0"/>
-              <a:t>22/02/2024</a:t>
+              <a:t>28/02/2024</a:t>
             </a:fld>
             <a:endParaRPr lang="es-EC"/>
           </a:p>
@@ -973,7 +978,7 @@
           <a:p>
             <a:fld id="{4246B5AE-8C22-41D9-A161-61EDA0444373}" type="datetimeFigureOut">
               <a:rPr lang="es-EC" smtClean="0"/>
-              <a:t>22/02/2024</a:t>
+              <a:t>28/02/2024</a:t>
             </a:fld>
             <a:endParaRPr lang="es-EC"/>
           </a:p>
@@ -1316,7 +1321,7 @@
           <a:p>
             <a:fld id="{4246B5AE-8C22-41D9-A161-61EDA0444373}" type="datetimeFigureOut">
               <a:rPr lang="es-EC" smtClean="0"/>
-              <a:t>22/02/2024</a:t>
+              <a:t>28/02/2024</a:t>
             </a:fld>
             <a:endParaRPr lang="es-EC"/>
           </a:p>
@@ -1591,7 +1596,7 @@
           <a:p>
             <a:fld id="{4246B5AE-8C22-41D9-A161-61EDA0444373}" type="datetimeFigureOut">
               <a:rPr lang="es-EC" smtClean="0"/>
-              <a:t>22/02/2024</a:t>
+              <a:t>28/02/2024</a:t>
             </a:fld>
             <a:endParaRPr lang="es-EC"/>
           </a:p>
@@ -1970,7 +1975,7 @@
           <a:p>
             <a:fld id="{4246B5AE-8C22-41D9-A161-61EDA0444373}" type="datetimeFigureOut">
               <a:rPr lang="es-EC" smtClean="0"/>
-              <a:t>22/02/2024</a:t>
+              <a:t>28/02/2024</a:t>
             </a:fld>
             <a:endParaRPr lang="es-EC"/>
           </a:p>
@@ -2088,7 +2093,7 @@
           <a:p>
             <a:fld id="{4246B5AE-8C22-41D9-A161-61EDA0444373}" type="datetimeFigureOut">
               <a:rPr lang="es-EC" smtClean="0"/>
-              <a:t>22/02/2024</a:t>
+              <a:t>28/02/2024</a:t>
             </a:fld>
             <a:endParaRPr lang="es-EC"/>
           </a:p>
@@ -2259,7 +2264,7 @@
           <a:p>
             <a:fld id="{4246B5AE-8C22-41D9-A161-61EDA0444373}" type="datetimeFigureOut">
               <a:rPr lang="es-EC" smtClean="0"/>
-              <a:t>22/02/2024</a:t>
+              <a:t>28/02/2024</a:t>
             </a:fld>
             <a:endParaRPr lang="es-EC"/>
           </a:p>
@@ -2613,7 +2618,7 @@
           <a:p>
             <a:fld id="{4246B5AE-8C22-41D9-A161-61EDA0444373}" type="datetimeFigureOut">
               <a:rPr lang="es-EC" smtClean="0"/>
-              <a:t>22/02/2024</a:t>
+              <a:t>28/02/2024</a:t>
             </a:fld>
             <a:endParaRPr lang="es-EC"/>
           </a:p>
@@ -2995,7 +3000,7 @@
           <a:p>
             <a:fld id="{4246B5AE-8C22-41D9-A161-61EDA0444373}" type="datetimeFigureOut">
               <a:rPr lang="es-EC" smtClean="0"/>
-              <a:t>22/02/2024</a:t>
+              <a:t>28/02/2024</a:t>
             </a:fld>
             <a:endParaRPr lang="es-EC"/>
           </a:p>
@@ -3282,7 +3287,7 @@
           <a:p>
             <a:fld id="{4246B5AE-8C22-41D9-A161-61EDA0444373}" type="datetimeFigureOut">
               <a:rPr lang="es-EC" smtClean="0"/>
-              <a:t>22/02/2024</a:t>
+              <a:t>28/02/2024</a:t>
             </a:fld>
             <a:endParaRPr lang="es-EC"/>
           </a:p>
@@ -3875,7 +3880,7 @@
             </a:pPr>
             <a:r>
               <a:rPr lang="es-EC" dirty="0"/>
-              <a:t>Esp32 server </a:t>
+              <a:t>Esp32 server, REST API</a:t>
             </a:r>
           </a:p>
           <a:p>
@@ -3916,6 +3921,117 @@
               </a:rPr>
               <a:t>)</a:t>
             </a:r>
+          </a:p>
+          <a:p>
+            <a:pPr marL="457200" indent="-457200">
+              <a:buFont typeface="+mj-lt"/>
+              <a:buAutoNum type="arabicPeriod"/>
+            </a:pPr>
+            <a:r>
+              <a:rPr lang="es-EC" dirty="0" err="1"/>
+              <a:t>npx</a:t>
+            </a:r>
+            <a:r>
+              <a:rPr lang="es-EC" dirty="0"/>
+              <a:t> http-server ./(</a:t>
+            </a:r>
+            <a:r>
+              <a:rPr lang="es-EC"/>
+              <a:t>frontend) </a:t>
+            </a:r>
+            <a:r>
+              <a:rPr lang="es-EC" dirty="0"/>
+              <a:t>-P </a:t>
+            </a:r>
+            <a:r>
+              <a:rPr lang="es-EC" dirty="0">
+                <a:solidFill>
+                  <a:srgbClr val="FF0000"/>
+                </a:solidFill>
+              </a:rPr>
+              <a:t>(</a:t>
+            </a:r>
+            <a:r>
+              <a:rPr lang="es-EC">
+                <a:solidFill>
+                  <a:srgbClr val="FF0000"/>
+                </a:solidFill>
+                <a:hlinkClick r:id="rId3" invalidUrl="http:///"/>
+              </a:rPr>
+              <a:t>http://</a:t>
+            </a:r>
+            <a:r>
+              <a:rPr lang="es-EC">
+                <a:solidFill>
+                  <a:srgbClr val="FF0000"/>
+                </a:solidFill>
+              </a:rPr>
+              <a:t>ip_esp32)</a:t>
+            </a:r>
+            <a:endParaRPr lang="es-EC" dirty="0">
+              <a:solidFill>
+                <a:srgbClr val="FF0000"/>
+              </a:solidFill>
+            </a:endParaRPr>
+          </a:p>
+          <a:p>
+            <a:pPr marL="457200" indent="-457200">
+              <a:buFont typeface="+mj-lt"/>
+              <a:buAutoNum type="arabicPeriod"/>
+            </a:pPr>
+            <a:r>
+              <a:rPr lang="es-EC" dirty="0">
+                <a:solidFill>
+                  <a:schemeClr val="tx1"/>
+                </a:solidFill>
+              </a:rPr>
+              <a:t>Access </a:t>
+            </a:r>
+            <a:r>
+              <a:rPr lang="es-EC" dirty="0" err="1">
+                <a:solidFill>
+                  <a:schemeClr val="tx1"/>
+                </a:solidFill>
+              </a:rPr>
+              <a:t>point</a:t>
+            </a:r>
+            <a:r>
+              <a:rPr lang="es-EC" dirty="0">
+                <a:solidFill>
+                  <a:schemeClr val="tx1"/>
+                </a:solidFill>
+              </a:rPr>
+              <a:t> </a:t>
+            </a:r>
+            <a:r>
+              <a:rPr lang="es-EC" dirty="0" err="1">
+                <a:solidFill>
+                  <a:schemeClr val="tx1"/>
+                </a:solidFill>
+              </a:rPr>
+              <a:t>or</a:t>
+            </a:r>
+            <a:r>
+              <a:rPr lang="es-EC" dirty="0">
+                <a:solidFill>
+                  <a:schemeClr val="tx1"/>
+                </a:solidFill>
+              </a:rPr>
+              <a:t> </a:t>
+            </a:r>
+            <a:r>
+              <a:rPr lang="es-EC" dirty="0" err="1">
+                <a:solidFill>
+                  <a:schemeClr val="tx1"/>
+                </a:solidFill>
+              </a:rPr>
+              <a:t>Station</a:t>
+            </a:r>
+            <a:endParaRPr lang="es-EC" dirty="0">
+              <a:solidFill>
+                <a:schemeClr val="tx1"/>
+              </a:solidFill>
+            </a:endParaRPr>
           </a:p>
           <a:p>
             <a:pPr marL="457200" indent="-457200">
@@ -3932,10 +4048,10 @@
       </p:sp>
       <p:pic>
         <p:nvPicPr>
-          <p:cNvPr id="9" name="Imagen 8">
+          <p:cNvPr id="5" name="Imagen 4" descr="Diagrama&#10;&#10;Descripción generada automáticamente">
             <a:extLst>
               <a:ext uri="{FF2B5EF4-FFF2-40B4-BE49-F238E27FC236}">
-                <a16:creationId xmlns:a16="http://schemas.microsoft.com/office/drawing/2014/main" id="{6D11AB27-A62A-A83E-7986-6BDC92377C3D}"/>
+                <a16:creationId xmlns:a16="http://schemas.microsoft.com/office/drawing/2014/main" id="{FA5ECA5C-C76D-2844-1818-B26FCC0FF2C4}"/>
               </a:ext>
             </a:extLst>
           </p:cNvPr>
@@ -3945,15 +4061,57 @@
           <p:nvPr/>
         </p:nvPicPr>
         <p:blipFill>
-          <a:blip r:embed="rId3"/>
+          <a:blip r:embed="rId4">
+            <a:extLst>
+              <a:ext uri="{28A0092B-C50C-407E-A947-70E740481C1C}">
+                <a14:useLocalDpi xmlns:a14="http://schemas.microsoft.com/office/drawing/2010/main" val="0"/>
+              </a:ext>
+            </a:extLst>
+          </a:blip>
           <a:stretch>
             <a:fillRect/>
           </a:stretch>
         </p:blipFill>
         <p:spPr>
           <a:xfrm>
-            <a:off x="6672650" y="1845733"/>
-            <a:ext cx="3665667" cy="2539831"/>
+            <a:off x="7070964" y="1845734"/>
+            <a:ext cx="3399983" cy="2166429"/>
+          </a:xfrm>
+          <a:prstGeom prst="rect">
+            <a:avLst/>
+          </a:prstGeom>
+        </p:spPr>
+      </p:pic>
+      <p:pic>
+        <p:nvPicPr>
+          <p:cNvPr id="7" name="Imagen 6" descr="Diagrama&#10;&#10;Descripción generada automáticamente">
+            <a:extLst>
+              <a:ext uri="{FF2B5EF4-FFF2-40B4-BE49-F238E27FC236}">
+                <a16:creationId xmlns:a16="http://schemas.microsoft.com/office/drawing/2014/main" id="{BF4AF6AC-9A33-48A0-25BD-05842CE07B39}"/>
+              </a:ext>
+            </a:extLst>
+          </p:cNvPr>
+          <p:cNvPicPr>
+            <a:picLocks noChangeAspect="1"/>
+          </p:cNvPicPr>
+          <p:nvPr/>
+        </p:nvPicPr>
+        <p:blipFill>
+          <a:blip r:embed="rId5">
+            <a:extLst>
+              <a:ext uri="{28A0092B-C50C-407E-A947-70E740481C1C}">
+                <a14:useLocalDpi xmlns:a14="http://schemas.microsoft.com/office/drawing/2010/main" val="0"/>
+              </a:ext>
+            </a:extLst>
+          </a:blip>
+          <a:stretch>
+            <a:fillRect/>
+          </a:stretch>
+        </p:blipFill>
+        <p:spPr>
+          <a:xfrm>
+            <a:off x="8633052" y="4120537"/>
+            <a:ext cx="3254125" cy="2073490"/>
           </a:xfrm>
           <a:prstGeom prst="rect">
             <a:avLst/>

</xml_diff>